<commit_message>
Updated resource relationship Diagram
</commit_message>
<xml_diff>
--- a/input/images/CARIN_BB_Profile_Relationship_Diagram.pptx
+++ b/input/images/CARIN_BB_Profile_Relationship_Diagram.pptx
@@ -2834,7 +2834,7 @@
                 <a14:useLocalDpi xmlns:a14="http://schemas.microsoft.com/office/drawing/2010/main" val="0"/>
               </a:ext>
               <a:ext uri="{96DAC541-7B7A-43D3-8B79-37D633B846F1}">
-                <asvg:svgBlip xmlns="" xmlns:asvg="http://schemas.microsoft.com/office/drawing/2016/SVG/main" r:embed="rId3"/>
+                <asvg:svgBlip xmlns:asvg="http://schemas.microsoft.com/office/drawing/2016/SVG/main" r:embed="rId3"/>
               </a:ext>
             </a:extLst>
           </a:blip>
@@ -2896,7 +2896,7 @@
                   <a14:useLocalDpi xmlns:a14="http://schemas.microsoft.com/office/drawing/2010/main" val="0"/>
                 </a:ext>
                 <a:ext uri="{96DAC541-7B7A-43D3-8B79-37D633B846F1}">
-                  <asvg:svgBlip xmlns="" xmlns:asvg="http://schemas.microsoft.com/office/drawing/2016/SVG/main" r:embed="rId5"/>
+                  <asvg:svgBlip xmlns:asvg="http://schemas.microsoft.com/office/drawing/2016/SVG/main" r:embed="rId5"/>
                 </a:ext>
               </a:extLst>
             </a:blip>
@@ -2935,7 +2935,7 @@
                   <a14:useLocalDpi xmlns:a14="http://schemas.microsoft.com/office/drawing/2010/main" val="0"/>
                 </a:ext>
                 <a:ext uri="{96DAC541-7B7A-43D3-8B79-37D633B846F1}">
-                  <asvg:svgBlip xmlns="" xmlns:asvg="http://schemas.microsoft.com/office/drawing/2016/SVG/main" r:embed="rId7"/>
+                  <asvg:svgBlip xmlns:asvg="http://schemas.microsoft.com/office/drawing/2016/SVG/main" r:embed="rId7"/>
                 </a:ext>
               </a:extLst>
             </a:blip>
@@ -3786,7 +3786,7 @@
                 <a14:useLocalDpi xmlns:a14="http://schemas.microsoft.com/office/drawing/2010/main" val="0"/>
               </a:ext>
               <a:ext uri="{96DAC541-7B7A-43D3-8B79-37D633B846F1}">
-                <asvg:svgBlip xmlns="" xmlns:asvg="http://schemas.microsoft.com/office/drawing/2016/SVG/main" r:embed="rId4"/>
+                <asvg:svgBlip xmlns:asvg="http://schemas.microsoft.com/office/drawing/2016/SVG/main" r:embed="rId4"/>
               </a:ext>
             </a:extLst>
           </a:blip>
@@ -3848,7 +3848,7 @@
                   <a14:useLocalDpi xmlns:a14="http://schemas.microsoft.com/office/drawing/2010/main" val="0"/>
                 </a:ext>
                 <a:ext uri="{96DAC541-7B7A-43D3-8B79-37D633B846F1}">
-                  <asvg:svgBlip xmlns="" xmlns:asvg="http://schemas.microsoft.com/office/drawing/2016/SVG/main" r:embed="rId6"/>
+                  <asvg:svgBlip xmlns:asvg="http://schemas.microsoft.com/office/drawing/2016/SVG/main" r:embed="rId6"/>
                 </a:ext>
               </a:extLst>
             </a:blip>
@@ -3887,7 +3887,7 @@
                   <a14:useLocalDpi xmlns:a14="http://schemas.microsoft.com/office/drawing/2010/main" val="0"/>
                 </a:ext>
                 <a:ext uri="{96DAC541-7B7A-43D3-8B79-37D633B846F1}">
-                  <asvg:svgBlip xmlns="" xmlns:asvg="http://schemas.microsoft.com/office/drawing/2016/SVG/main" r:embed="rId8"/>
+                  <asvg:svgBlip xmlns:asvg="http://schemas.microsoft.com/office/drawing/2016/SVG/main" r:embed="rId8"/>
                 </a:ext>
               </a:extLst>
             </a:blip>
@@ -4083,7 +4083,7 @@
                 <a14:useLocalDpi xmlns:a14="http://schemas.microsoft.com/office/drawing/2010/main" val="0"/>
               </a:ext>
               <a:ext uri="{96DAC541-7B7A-43D3-8B79-37D633B846F1}">
-                <asvg:svgBlip xmlns="" xmlns:asvg="http://schemas.microsoft.com/office/drawing/2016/SVG/main" r:embed="rId11"/>
+                <asvg:svgBlip xmlns:asvg="http://schemas.microsoft.com/office/drawing/2016/SVG/main" r:embed="rId11"/>
               </a:ext>
             </a:extLst>
           </a:blip>
@@ -4377,466 +4377,6 @@
           <a:chExt cx="0" cy="0"/>
         </a:xfrm>
       </p:grpSpPr>
-      <p:sp>
-        <p:nvSpPr>
-          <p:cNvPr id="4" name="Rectangle 7">
-            <a:extLst>
-              <a:ext uri="{FF2B5EF4-FFF2-40B4-BE49-F238E27FC236}">
-                <a16:creationId xmlns:a16="http://schemas.microsoft.com/office/drawing/2014/main" id="{36F021CD-7155-4998-8F4A-6CF682C76676}"/>
-              </a:ext>
-            </a:extLst>
-          </p:cNvPr>
-          <p:cNvSpPr>
-            <a:spLocks noChangeArrowheads="1"/>
-          </p:cNvSpPr>
-          <p:nvPr userDrawn="1"/>
-        </p:nvSpPr>
-        <p:spPr bwMode="auto">
-          <a:xfrm>
-            <a:off x="0" y="0"/>
-            <a:ext cx="12161838" cy="800434"/>
-          </a:xfrm>
-          <a:prstGeom prst="rect">
-            <a:avLst/>
-          </a:prstGeom>
-          <a:solidFill>
-            <a:schemeClr val="accent5"/>
-          </a:solidFill>
-          <a:ln w="9525" algn="ctr">
-            <a:noFill/>
-            <a:round/>
-            <a:headEnd/>
-            <a:tailEnd/>
-          </a:ln>
-        </p:spPr>
-        <p:txBody>
-          <a:bodyPr lIns="68577" tIns="34289" rIns="68577" bIns="34289" anchor="ctr" anchorCtr="0"/>
-          <a:lstStyle/>
-          <a:p>
-            <a:pPr defTabSz="685800" eaLnBrk="0" fontAlgn="base" hangingPunct="0">
-              <a:spcBef>
-                <a:spcPct val="0"/>
-              </a:spcBef>
-              <a:spcAft>
-                <a:spcPct val="0"/>
-              </a:spcAft>
-              <a:defRPr/>
-            </a:pPr>
-            <a:endParaRPr lang="en-US" dirty="0">
-              <a:solidFill>
-                <a:prstClr val="black"/>
-              </a:solidFill>
-              <a:ea typeface="ヒラギノ角ゴ Pro W3" pitchFamily="-112" charset="-128"/>
-            </a:endParaRPr>
-          </a:p>
-        </p:txBody>
-      </p:sp>
-      <p:sp>
-        <p:nvSpPr>
-          <p:cNvPr id="5" name="Title 1">
-            <a:extLst>
-              <a:ext uri="{FF2B5EF4-FFF2-40B4-BE49-F238E27FC236}">
-                <a16:creationId xmlns:a16="http://schemas.microsoft.com/office/drawing/2014/main" id="{32C19A58-A0F5-47C2-9612-FDD340ACF951}"/>
-              </a:ext>
-            </a:extLst>
-          </p:cNvPr>
-          <p:cNvSpPr>
-            <a:spLocks noGrp="1"/>
-          </p:cNvSpPr>
-          <p:nvPr>
-            <p:ph type="title"/>
-          </p:nvPr>
-        </p:nvSpPr>
-        <p:spPr>
-          <a:xfrm>
-            <a:off x="304046" y="93893"/>
-            <a:ext cx="11517261" cy="612648"/>
-          </a:xfrm>
-          <a:prstGeom prst="rect">
-            <a:avLst/>
-          </a:prstGeom>
-        </p:spPr>
-        <p:txBody>
-          <a:bodyPr lIns="91438" tIns="45719" rIns="91438" bIns="45719">
-            <a:noAutofit/>
-          </a:bodyPr>
-          <a:lstStyle>
-            <a:lvl1pPr algn="l">
-              <a:lnSpc>
-                <a:spcPct val="100000"/>
-              </a:lnSpc>
-              <a:defRPr sz="3200" b="1">
-                <a:solidFill>
-                  <a:schemeClr val="bg1"/>
-                </a:solidFill>
-                <a:latin typeface="+mj-lt"/>
-              </a:defRPr>
-            </a:lvl1pPr>
-          </a:lstStyle>
-          <a:p>
-            <a:r>
-              <a:rPr lang="en-US"/>
-              <a:t>Click to edit Master title style</a:t>
-            </a:r>
-            <a:endParaRPr lang="en-US" dirty="0"/>
-          </a:p>
-        </p:txBody>
-      </p:sp>
-      <p:sp>
-        <p:nvSpPr>
-          <p:cNvPr id="6" name="Rectangle 7">
-            <a:extLst>
-              <a:ext uri="{FF2B5EF4-FFF2-40B4-BE49-F238E27FC236}">
-                <a16:creationId xmlns:a16="http://schemas.microsoft.com/office/drawing/2014/main" id="{A350D338-3B08-4525-82EC-82BE66663545}"/>
-              </a:ext>
-            </a:extLst>
-          </p:cNvPr>
-          <p:cNvSpPr>
-            <a:spLocks noChangeArrowheads="1"/>
-          </p:cNvSpPr>
-          <p:nvPr userDrawn="1"/>
-        </p:nvSpPr>
-        <p:spPr bwMode="auto">
-          <a:xfrm flipH="1">
-            <a:off x="0" y="6571322"/>
-            <a:ext cx="12161838" cy="286678"/>
-          </a:xfrm>
-          <a:prstGeom prst="rect">
-            <a:avLst/>
-          </a:prstGeom>
-          <a:solidFill>
-            <a:schemeClr val="accent1"/>
-          </a:solidFill>
-          <a:ln w="9525" algn="ctr">
-            <a:noFill/>
-            <a:round/>
-            <a:headEnd/>
-            <a:tailEnd/>
-          </a:ln>
-        </p:spPr>
-        <p:txBody>
-          <a:bodyPr lIns="68577" tIns="34289" rIns="68577" bIns="34289"/>
-          <a:lstStyle/>
-          <a:p>
-            <a:pPr defTabSz="685800" eaLnBrk="0" fontAlgn="base" hangingPunct="0">
-              <a:spcBef>
-                <a:spcPct val="0"/>
-              </a:spcBef>
-              <a:spcAft>
-                <a:spcPct val="0"/>
-              </a:spcAft>
-              <a:defRPr/>
-            </a:pPr>
-            <a:endParaRPr lang="en-US" dirty="0">
-              <a:solidFill>
-                <a:prstClr val="black"/>
-              </a:solidFill>
-              <a:ea typeface="ヒラギノ角ゴ Pro W3" pitchFamily="-112" charset="-128"/>
-            </a:endParaRPr>
-          </a:p>
-        </p:txBody>
-      </p:sp>
-      <p:sp>
-        <p:nvSpPr>
-          <p:cNvPr id="7" name="Flowchart: Manual Input 6">
-            <a:extLst>
-              <a:ext uri="{FF2B5EF4-FFF2-40B4-BE49-F238E27FC236}">
-                <a16:creationId xmlns:a16="http://schemas.microsoft.com/office/drawing/2014/main" id="{777035E4-0850-4521-9067-59B256478136}"/>
-              </a:ext>
-            </a:extLst>
-          </p:cNvPr>
-          <p:cNvSpPr/>
-          <p:nvPr userDrawn="1"/>
-        </p:nvSpPr>
-        <p:spPr>
-          <a:xfrm rot="16200000" flipH="1">
-            <a:off x="11606940" y="6303100"/>
-            <a:ext cx="286678" cy="823121"/>
-          </a:xfrm>
-          <a:prstGeom prst="flowChartManualInput">
-            <a:avLst/>
-          </a:prstGeom>
-          <a:solidFill>
-            <a:schemeClr val="accent5"/>
-          </a:solidFill>
-          <a:ln>
-            <a:noFill/>
-          </a:ln>
-        </p:spPr>
-        <p:style>
-          <a:lnRef idx="2">
-            <a:schemeClr val="accent1">
-              <a:shade val="50000"/>
-            </a:schemeClr>
-          </a:lnRef>
-          <a:fillRef idx="1">
-            <a:schemeClr val="accent1"/>
-          </a:fillRef>
-          <a:effectRef idx="0">
-            <a:schemeClr val="accent1"/>
-          </a:effectRef>
-          <a:fontRef idx="minor">
-            <a:schemeClr val="lt1"/>
-          </a:fontRef>
-        </p:style>
-        <p:txBody>
-          <a:bodyPr rtlCol="0" anchor="ctr"/>
-          <a:lstStyle/>
-          <a:p>
-            <a:pPr algn="ctr"/>
-            <a:endParaRPr lang="en-US" dirty="0"/>
-          </a:p>
-        </p:txBody>
-      </p:sp>
-      <p:sp>
-        <p:nvSpPr>
-          <p:cNvPr id="8" name="Rectangle 6">
-            <a:extLst>
-              <a:ext uri="{FF2B5EF4-FFF2-40B4-BE49-F238E27FC236}">
-                <a16:creationId xmlns:a16="http://schemas.microsoft.com/office/drawing/2014/main" id="{7882DA79-89A4-4FBE-BBEE-A2D6BDFD6B0E}"/>
-              </a:ext>
-            </a:extLst>
-          </p:cNvPr>
-          <p:cNvSpPr>
-            <a:spLocks noChangeArrowheads="1"/>
-          </p:cNvSpPr>
-          <p:nvPr userDrawn="1"/>
-        </p:nvSpPr>
-        <p:spPr bwMode="auto">
-          <a:xfrm>
-            <a:off x="137319" y="6618481"/>
-            <a:ext cx="1258993" cy="192358"/>
-          </a:xfrm>
-          <a:prstGeom prst="rect">
-            <a:avLst/>
-          </a:prstGeom>
-          <a:noFill/>
-          <a:ln w="9525">
-            <a:noFill/>
-            <a:miter lim="800000"/>
-            <a:headEnd/>
-            <a:tailEnd/>
-          </a:ln>
-        </p:spPr>
-        <p:txBody>
-          <a:bodyPr wrap="none" lIns="68577" tIns="34289" rIns="68577" bIns="34289">
-            <a:spAutoFit/>
-          </a:bodyPr>
-          <a:lstStyle/>
-          <a:p>
-            <a:pPr defTabSz="685800" eaLnBrk="0" fontAlgn="base" hangingPunct="0">
-              <a:spcBef>
-                <a:spcPct val="0"/>
-              </a:spcBef>
-              <a:spcAft>
-                <a:spcPct val="0"/>
-              </a:spcAft>
-              <a:defRPr/>
-            </a:pPr>
-            <a:r>
-              <a:rPr lang="en-US" sz="800" dirty="0">
-                <a:solidFill>
-                  <a:schemeClr val="bg1"/>
-                </a:solidFill>
-                <a:latin typeface="+mj-lt"/>
-                <a:ea typeface="ヒラギノ角ゴ Pro W3" pitchFamily="-112" charset="-128"/>
-                <a:cs typeface="Segoe UI" pitchFamily="34" charset="0"/>
-              </a:rPr>
-              <a:t>©2019 LEAVITT PARTNERS </a:t>
-            </a:r>
-          </a:p>
-        </p:txBody>
-      </p:sp>
-      <p:sp>
-        <p:nvSpPr>
-          <p:cNvPr id="9" name="TextBox 8">
-            <a:extLst>
-              <a:ext uri="{FF2B5EF4-FFF2-40B4-BE49-F238E27FC236}">
-                <a16:creationId xmlns:a16="http://schemas.microsoft.com/office/drawing/2014/main" id="{961B40CD-0932-4D43-819F-0D0DF9B000C5}"/>
-              </a:ext>
-            </a:extLst>
-          </p:cNvPr>
-          <p:cNvSpPr txBox="1"/>
-          <p:nvPr userDrawn="1"/>
-        </p:nvSpPr>
-        <p:spPr>
-          <a:xfrm>
-            <a:off x="11561438" y="6599245"/>
-            <a:ext cx="377682" cy="230830"/>
-          </a:xfrm>
-          <a:prstGeom prst="rect">
-            <a:avLst/>
-          </a:prstGeom>
-          <a:noFill/>
-        </p:spPr>
-        <p:txBody>
-          <a:bodyPr wrap="square" lIns="68577" tIns="34289" rIns="68577" bIns="34289" rtlCol="0">
-            <a:spAutoFit/>
-          </a:bodyPr>
-          <a:lstStyle/>
-          <a:p>
-            <a:pPr algn="r" defTabSz="685800"/>
-            <a:fld id="{879E2ECD-52C4-4036-9BD3-F4AEC1C18931}" type="slidenum">
-              <a:rPr lang="en-US" sz="1050">
-                <a:solidFill>
-                  <a:schemeClr val="bg1"/>
-                </a:solidFill>
-              </a:rPr>
-              <a:pPr algn="r" defTabSz="685800"/>
-              <a:t>‹#›</a:t>
-            </a:fld>
-            <a:endParaRPr lang="en-US" sz="1050" dirty="0">
-              <a:solidFill>
-                <a:schemeClr val="bg1"/>
-              </a:solidFill>
-            </a:endParaRPr>
-          </a:p>
-        </p:txBody>
-      </p:sp>
-      <p:sp>
-        <p:nvSpPr>
-          <p:cNvPr id="10" name="Content Placeholder 2">
-            <a:extLst>
-              <a:ext uri="{FF2B5EF4-FFF2-40B4-BE49-F238E27FC236}">
-                <a16:creationId xmlns:a16="http://schemas.microsoft.com/office/drawing/2014/main" id="{F57C8BBA-F36D-472A-A2F8-2D1CC97A3767}"/>
-              </a:ext>
-            </a:extLst>
-          </p:cNvPr>
-          <p:cNvSpPr>
-            <a:spLocks noGrp="1"/>
-          </p:cNvSpPr>
-          <p:nvPr>
-            <p:ph idx="1"/>
-          </p:nvPr>
-        </p:nvSpPr>
-        <p:spPr>
-          <a:xfrm>
-            <a:off x="322128" y="929634"/>
-            <a:ext cx="11517261" cy="5553645"/>
-          </a:xfrm>
-          <a:prstGeom prst="rect">
-            <a:avLst/>
-          </a:prstGeom>
-        </p:spPr>
-        <p:txBody>
-          <a:bodyPr/>
-          <a:lstStyle>
-            <a:lvl1pPr marL="0" indent="0">
-              <a:buNone/>
-              <a:defRPr sz="2400">
-                <a:solidFill>
-                  <a:schemeClr val="accent5"/>
-                </a:solidFill>
-                <a:latin typeface="+mj-lt"/>
-              </a:defRPr>
-            </a:lvl1pPr>
-            <a:lvl2pPr>
-              <a:defRPr sz="2000">
-                <a:solidFill>
-                  <a:schemeClr val="accent5"/>
-                </a:solidFill>
-                <a:latin typeface="+mj-lt"/>
-              </a:defRPr>
-            </a:lvl2pPr>
-            <a:lvl3pPr>
-              <a:defRPr sz="1400">
-                <a:solidFill>
-                  <a:schemeClr val="accent5"/>
-                </a:solidFill>
-                <a:latin typeface="+mj-lt"/>
-              </a:defRPr>
-            </a:lvl3pPr>
-            <a:lvl4pPr>
-              <a:defRPr sz="1200">
-                <a:solidFill>
-                  <a:schemeClr val="accent5"/>
-                </a:solidFill>
-                <a:latin typeface="+mj-lt"/>
-              </a:defRPr>
-            </a:lvl4pPr>
-            <a:lvl5pPr>
-              <a:defRPr sz="1200">
-                <a:solidFill>
-                  <a:schemeClr val="accent5"/>
-                </a:solidFill>
-                <a:latin typeface="+mj-lt"/>
-              </a:defRPr>
-            </a:lvl5pPr>
-          </a:lstStyle>
-          <a:p>
-            <a:pPr lvl="0"/>
-            <a:r>
-              <a:rPr lang="en-US"/>
-              <a:t>Edit Master text styles</a:t>
-            </a:r>
-          </a:p>
-          <a:p>
-            <a:pPr lvl="1"/>
-            <a:r>
-              <a:rPr lang="en-US"/>
-              <a:t>Second level</a:t>
-            </a:r>
-          </a:p>
-          <a:p>
-            <a:pPr lvl="2"/>
-            <a:r>
-              <a:rPr lang="en-US"/>
-              <a:t>Third level</a:t>
-            </a:r>
-          </a:p>
-          <a:p>
-            <a:pPr lvl="3"/>
-            <a:r>
-              <a:rPr lang="en-US"/>
-              <a:t>Fourth level</a:t>
-            </a:r>
-          </a:p>
-          <a:p>
-            <a:pPr lvl="4"/>
-            <a:r>
-              <a:rPr lang="en-US"/>
-              <a:t>Fifth level</a:t>
-            </a:r>
-            <a:endParaRPr lang="en-US" dirty="0"/>
-          </a:p>
-        </p:txBody>
-      </p:sp>
-      <p:pic>
-        <p:nvPicPr>
-          <p:cNvPr id="11" name="Picture 10">
-            <a:extLst>
-              <a:ext uri="{FF2B5EF4-FFF2-40B4-BE49-F238E27FC236}">
-                <a16:creationId xmlns:a16="http://schemas.microsoft.com/office/drawing/2014/main" id="{55BB250D-C97E-401F-B6F3-EADDE70B330F}"/>
-              </a:ext>
-            </a:extLst>
-          </p:cNvPr>
-          <p:cNvPicPr>
-            <a:picLocks noChangeAspect="1"/>
-          </p:cNvPicPr>
-          <p:nvPr userDrawn="1"/>
-        </p:nvPicPr>
-        <p:blipFill>
-          <a:blip r:embed="rId2" cstate="print">
-            <a:extLst>
-              <a:ext uri="{28A0092B-C50C-407E-A947-70E740481C1C}">
-                <a14:useLocalDpi xmlns:a14="http://schemas.microsoft.com/office/drawing/2010/main" val="0"/>
-              </a:ext>
-            </a:extLst>
-          </a:blip>
-          <a:stretch>
-            <a:fillRect/>
-          </a:stretch>
-        </p:blipFill>
-        <p:spPr>
-          <a:xfrm>
-            <a:off x="10666566" y="-25964"/>
-            <a:ext cx="1495271" cy="826398"/>
-          </a:xfrm>
-          <a:prstGeom prst="rect">
-            <a:avLst/>
-          </a:prstGeom>
-        </p:spPr>
-      </p:pic>
     </p:spTree>
     <p:extLst>
       <p:ext uri="{BB962C8B-B14F-4D97-AF65-F5344CB8AC3E}">
@@ -9701,13 +9241,13 @@
             <a:spLocks noGrp="1"/>
           </p:cNvSpPr>
           <p:nvPr>
-            <p:ph type="ftr" sz="quarter" idx="10"/>
+            <p:ph type="ftr" sz="quarter" idx="4294967295"/>
           </p:nvPr>
         </p:nvSpPr>
         <p:spPr>
           <a:xfrm>
-            <a:off x="2426645" y="9000678"/>
-            <a:ext cx="6026022" cy="211143"/>
+            <a:off x="0" y="9001125"/>
+            <a:ext cx="6026150" cy="211138"/>
           </a:xfrm>
         </p:spPr>
         <p:txBody>
@@ -9841,7 +9381,7 @@
         </p:nvSpPr>
         <p:spPr>
           <a:xfrm>
-            <a:off x="8570028" y="1569109"/>
+            <a:off x="8349736" y="1180298"/>
             <a:ext cx="1851439" cy="1917854"/>
           </a:xfrm>
           <a:prstGeom prst="rect">
@@ -9905,7 +9445,7 @@
         </p:nvSpPr>
         <p:spPr>
           <a:xfrm>
-            <a:off x="3468239" y="4471949"/>
+            <a:off x="3247947" y="4083138"/>
             <a:ext cx="2509233" cy="1292964"/>
           </a:xfrm>
           <a:prstGeom prst="roundRect">
@@ -10014,7 +9554,7 @@
         </p:nvCxnSpPr>
         <p:spPr>
           <a:xfrm flipH="1">
-            <a:off x="2354299" y="5118432"/>
+            <a:off x="2134007" y="4729621"/>
             <a:ext cx="1113940" cy="2270"/>
           </a:xfrm>
           <a:prstGeom prst="straightConnector1">
@@ -10047,7 +9587,7 @@
         </p:nvSpPr>
         <p:spPr>
           <a:xfrm>
-            <a:off x="1015954" y="4798815"/>
+            <a:off x="795662" y="4410004"/>
             <a:ext cx="1338345" cy="643774"/>
           </a:xfrm>
           <a:prstGeom prst="roundRect">
@@ -10105,7 +9645,7 @@
         </p:nvCxnSpPr>
         <p:spPr>
           <a:xfrm flipH="1" flipV="1">
-            <a:off x="3270173" y="3484760"/>
+            <a:off x="3049881" y="3095949"/>
             <a:ext cx="1452684" cy="987189"/>
           </a:xfrm>
           <a:prstGeom prst="straightConnector1">
@@ -10138,7 +9678,7 @@
         </p:nvSpPr>
         <p:spPr>
           <a:xfrm>
-            <a:off x="662411" y="1531811"/>
+            <a:off x="442119" y="1143000"/>
             <a:ext cx="2073869" cy="643774"/>
           </a:xfrm>
           <a:prstGeom prst="roundRect">
@@ -10196,7 +9736,7 @@
         </p:nvCxnSpPr>
         <p:spPr>
           <a:xfrm>
-            <a:off x="5977472" y="5118431"/>
+            <a:off x="5757180" y="4729620"/>
             <a:ext cx="1125596" cy="230389"/>
           </a:xfrm>
           <a:prstGeom prst="straightConnector1">
@@ -10233,7 +9773,7 @@
         </p:nvCxnSpPr>
         <p:spPr>
           <a:xfrm flipH="1">
-            <a:off x="1685127" y="2175585"/>
+            <a:off x="1464835" y="1786774"/>
             <a:ext cx="14219" cy="2623230"/>
           </a:xfrm>
           <a:prstGeom prst="straightConnector1">
@@ -10270,7 +9810,7 @@
         </p:nvCxnSpPr>
         <p:spPr>
           <a:xfrm>
-            <a:off x="2736279" y="1853698"/>
+            <a:off x="2515987" y="1464887"/>
             <a:ext cx="1676799" cy="4638"/>
           </a:xfrm>
           <a:prstGeom prst="straightConnector1">
@@ -10303,7 +9843,7 @@
         </p:nvSpPr>
         <p:spPr>
           <a:xfrm>
-            <a:off x="4413078" y="1536448"/>
+            <a:off x="4192786" y="1147637"/>
             <a:ext cx="1338345" cy="643774"/>
           </a:xfrm>
           <a:prstGeom prst="roundRect">
@@ -10357,7 +9897,7 @@
         </p:nvSpPr>
         <p:spPr>
           <a:xfrm>
-            <a:off x="3054803" y="1214206"/>
+            <a:off x="2834511" y="825395"/>
             <a:ext cx="2922669" cy="619080"/>
           </a:xfrm>
           <a:prstGeom prst="rect">
@@ -10437,7 +9977,7 @@
         </p:nvSpPr>
         <p:spPr>
           <a:xfrm>
-            <a:off x="611750" y="2659457"/>
+            <a:off x="391458" y="2270646"/>
             <a:ext cx="1091966" cy="447174"/>
           </a:xfrm>
           <a:prstGeom prst="rect">
@@ -10500,7 +10040,7 @@
         </p:nvSpPr>
         <p:spPr>
           <a:xfrm>
-            <a:off x="2643657" y="3685605"/>
+            <a:off x="2423365" y="3296794"/>
             <a:ext cx="979755" cy="447174"/>
           </a:xfrm>
           <a:prstGeom prst="rect">
@@ -10563,7 +10103,7 @@
         </p:nvSpPr>
         <p:spPr>
           <a:xfrm>
-            <a:off x="6048003" y="5337535"/>
+            <a:off x="5827711" y="4948724"/>
             <a:ext cx="997389" cy="447174"/>
           </a:xfrm>
           <a:prstGeom prst="rect">
@@ -10630,7 +10170,7 @@
         </p:nvCxnSpPr>
         <p:spPr>
           <a:xfrm flipV="1">
-            <a:off x="5977472" y="2528036"/>
+            <a:off x="5757180" y="2139225"/>
             <a:ext cx="2592556" cy="2590396"/>
           </a:xfrm>
           <a:prstGeom prst="straightConnector1">
@@ -10663,7 +10203,7 @@
         </p:nvSpPr>
         <p:spPr>
           <a:xfrm>
-            <a:off x="8683035" y="2671964"/>
+            <a:off x="8462743" y="2283153"/>
             <a:ext cx="1586707" cy="643774"/>
           </a:xfrm>
           <a:prstGeom prst="roundRect">
@@ -10717,7 +10257,7 @@
         </p:nvSpPr>
         <p:spPr>
           <a:xfrm>
-            <a:off x="6299203" y="3691702"/>
+            <a:off x="6078911" y="3302891"/>
             <a:ext cx="997489" cy="447174"/>
           </a:xfrm>
           <a:prstGeom prst="rect">
@@ -10780,7 +10320,7 @@
         </p:nvSpPr>
         <p:spPr>
           <a:xfrm>
-            <a:off x="2605041" y="4905336"/>
+            <a:off x="2375945" y="4765290"/>
             <a:ext cx="772969" cy="447174"/>
           </a:xfrm>
           <a:prstGeom prst="rect">
@@ -10847,7 +10387,7 @@
         </p:nvCxnSpPr>
         <p:spPr>
           <a:xfrm flipV="1">
-            <a:off x="4722857" y="2180224"/>
+            <a:off x="4502565" y="1791413"/>
             <a:ext cx="359395" cy="2291726"/>
           </a:xfrm>
           <a:prstGeom prst="straightConnector1">
@@ -10880,7 +10420,7 @@
         </p:nvSpPr>
         <p:spPr>
           <a:xfrm>
-            <a:off x="10826892" y="4353485"/>
+            <a:off x="10606600" y="3964674"/>
             <a:ext cx="1140038" cy="643774"/>
           </a:xfrm>
           <a:prstGeom prst="roundRect">
@@ -10948,7 +10488,7 @@
         </p:nvSpPr>
         <p:spPr>
           <a:xfrm>
-            <a:off x="4228903" y="2790489"/>
+            <a:off x="4008611" y="2401678"/>
             <a:ext cx="853348" cy="447174"/>
           </a:xfrm>
           <a:prstGeom prst="rect">
@@ -11017,7 +10557,7 @@
         </p:nvSpPr>
         <p:spPr>
           <a:xfrm>
-            <a:off x="8683035" y="1712041"/>
+            <a:off x="8462743" y="1323230"/>
             <a:ext cx="1586707" cy="643774"/>
           </a:xfrm>
           <a:prstGeom prst="roundRect">
@@ -11071,7 +10611,7 @@
         </p:nvSpPr>
         <p:spPr>
           <a:xfrm>
-            <a:off x="8607024" y="4672013"/>
+            <a:off x="8386732" y="4283202"/>
             <a:ext cx="1586707" cy="643774"/>
           </a:xfrm>
           <a:prstGeom prst="roundRect">
@@ -11125,13 +10665,15 @@
         </p:nvSpPr>
         <p:spPr>
           <a:xfrm>
-            <a:off x="10826890" y="5164033"/>
+            <a:off x="10606598" y="4775222"/>
             <a:ext cx="1140037" cy="643774"/>
           </a:xfrm>
           <a:prstGeom prst="roundRect">
             <a:avLst/>
           </a:prstGeom>
-          <a:noFill/>
+          <a:solidFill>
+            <a:srgbClr val="E1E5ED"/>
+          </a:solidFill>
           <a:ln w="38100" cap="flat" cmpd="sng" algn="ctr">
             <a:solidFill>
               <a:srgbClr val="C00000"/>
@@ -11174,7 +10716,7 @@
         </p:nvSpPr>
         <p:spPr>
           <a:xfrm>
-            <a:off x="7103068" y="5178104"/>
+            <a:off x="6882776" y="4789293"/>
             <a:ext cx="376927" cy="341431"/>
           </a:xfrm>
           <a:prstGeom prst="bracePair">
@@ -11225,7 +10767,7 @@
         </p:nvCxnSpPr>
         <p:spPr>
           <a:xfrm flipV="1">
-            <a:off x="7479994" y="5012238"/>
+            <a:off x="7259702" y="4623427"/>
             <a:ext cx="1090033" cy="336583"/>
           </a:xfrm>
           <a:prstGeom prst="straightConnector1">
@@ -11258,7 +10800,7 @@
         </p:nvSpPr>
         <p:spPr>
           <a:xfrm>
-            <a:off x="7533821" y="4706927"/>
+            <a:off x="7313529" y="4318116"/>
             <a:ext cx="1149213" cy="447174"/>
           </a:xfrm>
           <a:prstGeom prst="rect">
@@ -11321,7 +10863,7 @@
         </p:nvSpPr>
         <p:spPr>
           <a:xfrm>
-            <a:off x="3081709" y="3143330"/>
+            <a:off x="2861417" y="2754519"/>
             <a:ext cx="376927" cy="341431"/>
           </a:xfrm>
           <a:prstGeom prst="bracePair">
@@ -11373,7 +10915,7 @@
         </p:nvCxnSpPr>
         <p:spPr>
           <a:xfrm flipH="1" flipV="1">
-            <a:off x="1699346" y="2175585"/>
+            <a:off x="1479054" y="1786774"/>
             <a:ext cx="1570827" cy="967745"/>
           </a:xfrm>
           <a:prstGeom prst="straightConnector1">
@@ -11406,7 +10948,7 @@
         </p:nvSpPr>
         <p:spPr>
           <a:xfrm>
-            <a:off x="2497436" y="2379396"/>
+            <a:off x="2277144" y="1990585"/>
             <a:ext cx="1068285" cy="447174"/>
           </a:xfrm>
           <a:prstGeom prst="rect">
@@ -11469,7 +11011,7 @@
         </p:nvSpPr>
         <p:spPr>
           <a:xfrm>
-            <a:off x="6459725" y="1561021"/>
+            <a:off x="6239433" y="1172210"/>
             <a:ext cx="1338345" cy="643774"/>
           </a:xfrm>
           <a:prstGeom prst="roundRect">
@@ -11527,7 +11069,7 @@
         </p:nvCxnSpPr>
         <p:spPr>
           <a:xfrm flipV="1">
-            <a:off x="4722856" y="2204795"/>
+            <a:off x="4502564" y="1815984"/>
             <a:ext cx="2406042" cy="2267155"/>
           </a:xfrm>
           <a:prstGeom prst="straightConnector1">
@@ -11560,7 +11102,7 @@
         </p:nvSpPr>
         <p:spPr>
           <a:xfrm>
-            <a:off x="4937862" y="2556860"/>
+            <a:off x="4717570" y="2168049"/>
             <a:ext cx="3272770" cy="619080"/>
           </a:xfrm>
           <a:prstGeom prst="rect">
@@ -11655,7 +11197,7 @@
         </p:nvSpPr>
         <p:spPr>
           <a:xfrm>
-            <a:off x="10761066" y="3734633"/>
+            <a:off x="10540774" y="3345822"/>
             <a:ext cx="1271685" cy="456069"/>
           </a:xfrm>
           <a:prstGeom prst="bracePair">
@@ -11685,49 +11227,183 @@
           <a:p>
             <a:pPr algn="ctr"/>
             <a:r>
-              <a:rPr lang="en-US" sz="1596" dirty="0" err="1">
+              <a:rPr lang="en-US" sz="1596" dirty="0">
                 <a:latin typeface="Calibri Light" panose="020F0302020204030204" pitchFamily="34" charset="0"/>
                 <a:cs typeface="Calibri Light" panose="020F0302020204030204" pitchFamily="34" charset="0"/>
               </a:rPr>
-              <a:t>BackboneElement</a:t>
-            </a:r>
-            <a:endParaRPr lang="en-US" sz="1596" dirty="0">
-              <a:latin typeface="Calibri Light" panose="020F0302020204030204" pitchFamily="34" charset="0"/>
-              <a:cs typeface="Calibri Light" panose="020F0302020204030204" pitchFamily="34" charset="0"/>
-            </a:endParaRPr>
+              <a:t>Backbone</a:t>
+            </a:r>
+            <a:br>
+              <a:rPr lang="en-US" sz="1596" dirty="0">
+                <a:latin typeface="Calibri Light" panose="020F0302020204030204" pitchFamily="34" charset="0"/>
+                <a:cs typeface="Calibri Light" panose="020F0302020204030204" pitchFamily="34" charset="0"/>
+              </a:rPr>
+            </a:br>
+            <a:r>
+              <a:rPr lang="en-US" sz="1596" dirty="0">
+                <a:latin typeface="Calibri Light" panose="020F0302020204030204" pitchFamily="34" charset="0"/>
+                <a:cs typeface="Calibri Light" panose="020F0302020204030204" pitchFamily="34" charset="0"/>
+              </a:rPr>
+              <a:t>Element</a:t>
+            </a:r>
           </a:p>
         </p:txBody>
       </p:sp>
       <p:sp>
         <p:nvSpPr>
-          <p:cNvPr id="42" name="Title 2">
-            <a:extLst>
-              <a:ext uri="{FF2B5EF4-FFF2-40B4-BE49-F238E27FC236}">
-                <a16:creationId xmlns:a16="http://schemas.microsoft.com/office/drawing/2014/main" id="{0B67D57E-26F3-A642-BF76-F55FAC07F598}"/>
-              </a:ext>
-            </a:extLst>
-          </p:cNvPr>
-          <p:cNvSpPr>
-            <a:spLocks noGrp="1"/>
-          </p:cNvSpPr>
-          <p:nvPr>
-            <p:ph type="title"/>
-          </p:nvPr>
+          <p:cNvPr id="2" name="Rounded Rectangle 26">
+            <a:extLst>
+              <a:ext uri="{FF2B5EF4-FFF2-40B4-BE49-F238E27FC236}">
+                <a16:creationId xmlns:a16="http://schemas.microsoft.com/office/drawing/2014/main" id="{6AFE5929-EBC2-FF8C-35AB-1E044E298EE1}"/>
+              </a:ext>
+            </a:extLst>
+          </p:cNvPr>
+          <p:cNvSpPr/>
+          <p:nvPr/>
         </p:nvSpPr>
         <p:spPr>
           <a:xfrm>
-            <a:off x="816172" y="274639"/>
-            <a:ext cx="10945654" cy="1043103"/>
-          </a:xfrm>
+            <a:off x="6645668" y="5627698"/>
+            <a:ext cx="1586707" cy="643774"/>
+          </a:xfrm>
+          <a:prstGeom prst="roundRect">
+            <a:avLst/>
+          </a:prstGeom>
+          <a:solidFill>
+            <a:srgbClr val="687DA1">
+              <a:lumMod val="20000"/>
+              <a:lumOff val="80000"/>
+            </a:srgbClr>
+          </a:solidFill>
+          <a:ln w="6350" cap="flat" cmpd="sng" algn="ctr">
+            <a:solidFill>
+              <a:srgbClr val="687CA1"/>
+            </a:solidFill>
+            <a:prstDash val="solid"/>
+            <a:miter lim="800000"/>
+          </a:ln>
+          <a:effectLst/>
         </p:spPr>
         <p:txBody>
-          <a:bodyPr/>
+          <a:bodyPr lIns="0" rIns="0" rtlCol="0" anchor="ctr"/>
           <a:lstStyle/>
           <a:p>
-            <a:pPr marL="342900" indent="-342900"/>
-            <a:r>
-              <a:rPr lang="en-US" sz="3200" dirty="0"/>
-              <a:t>CARIN BB Diagram</a:t>
+            <a:pPr algn="ctr" defTabSz="1216152">
+              <a:defRPr/>
+            </a:pPr>
+            <a:r>
+              <a:rPr lang="en-US" sz="1862" kern="0" dirty="0" err="1">
+                <a:solidFill>
+                  <a:sysClr val="windowText" lastClr="000000"/>
+                </a:solidFill>
+                <a:latin typeface="Calibri Light"/>
+              </a:rPr>
+              <a:t>RelatedPerson</a:t>
+            </a:r>
+            <a:endParaRPr lang="en-US" sz="1862" kern="0" dirty="0">
+              <a:solidFill>
+                <a:sysClr val="windowText" lastClr="000000"/>
+              </a:solidFill>
+              <a:latin typeface="Calibri Light"/>
+            </a:endParaRPr>
+          </a:p>
+        </p:txBody>
+      </p:sp>
+      <p:cxnSp>
+        <p:nvCxnSpPr>
+          <p:cNvPr id="3" name="Straight Arrow Connector 2">
+            <a:extLst>
+              <a:ext uri="{FF2B5EF4-FFF2-40B4-BE49-F238E27FC236}">
+                <a16:creationId xmlns:a16="http://schemas.microsoft.com/office/drawing/2014/main" id="{F4916A8B-48EB-F07D-5714-0CEF93282F8D}"/>
+              </a:ext>
+            </a:extLst>
+          </p:cNvPr>
+          <p:cNvCxnSpPr>
+            <a:cxnSpLocks/>
+            <a:endCxn id="2" idx="1"/>
+          </p:cNvCxnSpPr>
+          <p:nvPr/>
+        </p:nvCxnSpPr>
+        <p:spPr>
+          <a:xfrm>
+            <a:off x="5666951" y="5343507"/>
+            <a:ext cx="978717" cy="606078"/>
+          </a:xfrm>
+          <a:prstGeom prst="straightConnector1">
+            <a:avLst/>
+          </a:prstGeom>
+          <a:noFill/>
+          <a:ln w="12700" cap="flat" cmpd="sng" algn="ctr">
+            <a:solidFill>
+              <a:srgbClr val="687DA1"/>
+            </a:solidFill>
+            <a:prstDash val="solid"/>
+            <a:miter lim="800000"/>
+            <a:headEnd type="none" w="lg" len="lg"/>
+            <a:tailEnd type="triangle" w="lg" len="lg"/>
+          </a:ln>
+          <a:effectLst/>
+        </p:spPr>
+      </p:cxnSp>
+      <p:sp>
+        <p:nvSpPr>
+          <p:cNvPr id="6" name="TextBox 5">
+            <a:extLst>
+              <a:ext uri="{FF2B5EF4-FFF2-40B4-BE49-F238E27FC236}">
+                <a16:creationId xmlns:a16="http://schemas.microsoft.com/office/drawing/2014/main" id="{9EB97266-00C3-B7EC-31D4-7776707EA1B8}"/>
+              </a:ext>
+            </a:extLst>
+          </p:cNvPr>
+          <p:cNvSpPr txBox="1"/>
+          <p:nvPr/>
+        </p:nvSpPr>
+        <p:spPr>
+          <a:xfrm>
+            <a:off x="5317023" y="5715272"/>
+            <a:ext cx="1149213" cy="447174"/>
+          </a:xfrm>
+          <a:prstGeom prst="rect">
+            <a:avLst/>
+          </a:prstGeom>
+          <a:noFill/>
+        </p:spPr>
+        <p:txBody>
+          <a:bodyPr wrap="square" rtlCol="0">
+            <a:spAutoFit/>
+          </a:bodyPr>
+          <a:lstStyle/>
+          <a:p>
+            <a:pPr algn="ctr" defTabSz="1216152">
+              <a:lnSpc>
+                <a:spcPct val="70000"/>
+              </a:lnSpc>
+              <a:defRPr/>
+            </a:pPr>
+            <a:r>
+              <a:rPr lang="en-US" sz="1596" kern="0" dirty="0">
+                <a:solidFill>
+                  <a:prstClr val="black"/>
+                </a:solidFill>
+                <a:latin typeface="Calibri Light"/>
+              </a:rPr>
+              <a:t>Payee</a:t>
+            </a:r>
+          </a:p>
+          <a:p>
+            <a:pPr algn="ctr" defTabSz="1216152">
+              <a:lnSpc>
+                <a:spcPct val="70000"/>
+              </a:lnSpc>
+              <a:defRPr/>
+            </a:pPr>
+            <a:r>
+              <a:rPr lang="en-US" sz="1596" kern="0" dirty="0">
+                <a:solidFill>
+                  <a:prstClr val="black"/>
+                </a:solidFill>
+                <a:latin typeface="Calibri Light"/>
+              </a:rPr>
+              <a:t>0..1</a:t>
             </a:r>
           </a:p>
         </p:txBody>
@@ -12493,6 +12169,21 @@
 </file>
 
 <file path=customXml/item1.xml><?xml version="1.0" encoding="utf-8"?>
+<p:properties xmlns:p="http://schemas.microsoft.com/office/2006/metadata/properties" xmlns:xsi="http://www.w3.org/2001/XMLSchema-instance" xmlns:pc="http://schemas.microsoft.com/office/infopath/2007/PartnerControls">
+  <documentManagement/>
+</p:properties>
+</file>
+
+<file path=customXml/item2.xml><?xml version="1.0" encoding="utf-8"?>
+<?mso-contentType ?>
+<FormTemplates xmlns="http://schemas.microsoft.com/sharepoint/v3/contenttype/forms">
+  <Display>DocumentLibraryForm</Display>
+  <Edit>DocumentLibraryForm</Edit>
+  <New>DocumentLibraryForm</New>
+</FormTemplates>
+</file>
+
+<file path=customXml/item3.xml><?xml version="1.0" encoding="utf-8"?>
 <ct:contentTypeSchema xmlns:ct="http://schemas.microsoft.com/office/2006/metadata/contentType" xmlns:ma="http://schemas.microsoft.com/office/2006/metadata/properties/metaAttributes" ct:_="" ma:_="" ma:contentTypeName="Document" ma:contentTypeID="0x01010090E40985D0099F4A803BC5171826F53D" ma:contentTypeVersion="12" ma:contentTypeDescription="Create a new document." ma:contentTypeScope="" ma:versionID="cc2fbb810e6f82f4ef84e6cd2e45a728">
   <xsd:schema xmlns:xsd="http://www.w3.org/2001/XMLSchema" xmlns:xs="http://www.w3.org/2001/XMLSchema" xmlns:p="http://schemas.microsoft.com/office/2006/metadata/properties" xmlns:ns3="77e7b415-3fa1-4e40-925a-34ab31ed8693" xmlns:ns4="ed2921b8-ff97-45bc-a03c-58b4a5e2e9c8" targetNamespace="http://schemas.microsoft.com/office/2006/metadata/properties" ma:root="true" ma:fieldsID="e7d8c025294249a28771f1089e7e6a50" ns3:_="" ns4:_="">
     <xsd:import namespace="77e7b415-3fa1-4e40-925a-34ab31ed8693"/>
@@ -12709,22 +12400,32 @@
 </ct:contentTypeSchema>
 </file>
 
-<file path=customXml/item2.xml><?xml version="1.0" encoding="utf-8"?>
-<?mso-contentType ?>
-<FormTemplates xmlns="http://schemas.microsoft.com/sharepoint/v3/contenttype/forms">
-  <Display>DocumentLibraryForm</Display>
-  <Edit>DocumentLibraryForm</Edit>
-  <New>DocumentLibraryForm</New>
-</FormTemplates>
+<file path=customXml/itemProps1.xml><?xml version="1.0" encoding="utf-8"?>
+<ds:datastoreItem xmlns:ds="http://schemas.openxmlformats.org/officeDocument/2006/customXml" ds:itemID="{16865FFE-5233-4A4B-BF4A-9D8501DB6C61}">
+  <ds:schemaRefs>
+    <ds:schemaRef ds:uri="http://purl.org/dc/terms/"/>
+    <ds:schemaRef ds:uri="http://schemas.openxmlformats.org/package/2006/metadata/core-properties"/>
+    <ds:schemaRef ds:uri="http://schemas.microsoft.com/office/2006/documentManagement/types"/>
+    <ds:schemaRef ds:uri="http://schemas.microsoft.com/office/infopath/2007/PartnerControls"/>
+    <ds:schemaRef ds:uri="http://purl.org/dc/elements/1.1/"/>
+    <ds:schemaRef ds:uri="http://schemas.microsoft.com/office/2006/metadata/properties"/>
+    <ds:schemaRef ds:uri="ed2921b8-ff97-45bc-a03c-58b4a5e2e9c8"/>
+    <ds:schemaRef ds:uri="77e7b415-3fa1-4e40-925a-34ab31ed8693"/>
+    <ds:schemaRef ds:uri="http://www.w3.org/XML/1998/namespace"/>
+    <ds:schemaRef ds:uri="http://purl.org/dc/dcmitype/"/>
+  </ds:schemaRefs>
+</ds:datastoreItem>
 </file>
 
-<file path=customXml/item3.xml><?xml version="1.0" encoding="utf-8"?>
-<p:properties xmlns:p="http://schemas.microsoft.com/office/2006/metadata/properties" xmlns:xsi="http://www.w3.org/2001/XMLSchema-instance" xmlns:pc="http://schemas.microsoft.com/office/infopath/2007/PartnerControls">
-  <documentManagement/>
-</p:properties>
+<file path=customXml/itemProps2.xml><?xml version="1.0" encoding="utf-8"?>
+<ds:datastoreItem xmlns:ds="http://schemas.openxmlformats.org/officeDocument/2006/customXml" ds:itemID="{3538CD67-8D2F-4D66-97D6-5A8C2109C81C}">
+  <ds:schemaRefs>
+    <ds:schemaRef ds:uri="http://schemas.microsoft.com/sharepoint/v3/contenttype/forms"/>
+  </ds:schemaRefs>
+</ds:datastoreItem>
 </file>
 
-<file path=customXml/itemProps1.xml><?xml version="1.0" encoding="utf-8"?>
+<file path=customXml/itemProps3.xml><?xml version="1.0" encoding="utf-8"?>
 <ds:datastoreItem xmlns:ds="http://schemas.openxmlformats.org/officeDocument/2006/customXml" ds:itemID="{8386E4F4-04BE-4590-A845-0805396E0067}">
   <ds:schemaRefs>
     <ds:schemaRef ds:uri="http://schemas.microsoft.com/office/2006/metadata/contentType"/>
@@ -12741,29 +12442,4 @@
     <ds:schemaRef ds:uri="http://schemas.microsoft.com/internal/obd"/>
   </ds:schemaRefs>
 </ds:datastoreItem>
-</file>
-
-<file path=customXml/itemProps2.xml><?xml version="1.0" encoding="utf-8"?>
-<ds:datastoreItem xmlns:ds="http://schemas.openxmlformats.org/officeDocument/2006/customXml" ds:itemID="{3538CD67-8D2F-4D66-97D6-5A8C2109C81C}">
-  <ds:schemaRefs>
-    <ds:schemaRef ds:uri="http://schemas.microsoft.com/sharepoint/v3/contenttype/forms"/>
-  </ds:schemaRefs>
-</ds:datastoreItem>
-</file>
-
-<file path=customXml/itemProps3.xml><?xml version="1.0" encoding="utf-8"?>
-<ds:datastoreItem xmlns:ds="http://schemas.openxmlformats.org/officeDocument/2006/customXml" ds:itemID="{16865FFE-5233-4A4B-BF4A-9D8501DB6C61}">
-  <ds:schemaRefs>
-    <ds:schemaRef ds:uri="http://purl.org/dc/terms/"/>
-    <ds:schemaRef ds:uri="http://schemas.openxmlformats.org/package/2006/metadata/core-properties"/>
-    <ds:schemaRef ds:uri="http://schemas.microsoft.com/office/2006/documentManagement/types"/>
-    <ds:schemaRef ds:uri="http://schemas.microsoft.com/office/infopath/2007/PartnerControls"/>
-    <ds:schemaRef ds:uri="http://purl.org/dc/elements/1.1/"/>
-    <ds:schemaRef ds:uri="http://schemas.microsoft.com/office/2006/metadata/properties"/>
-    <ds:schemaRef ds:uri="ed2921b8-ff97-45bc-a03c-58b4a5e2e9c8"/>
-    <ds:schemaRef ds:uri="77e7b415-3fa1-4e40-925a-34ab31ed8693"/>
-    <ds:schemaRef ds:uri="http://www.w3.org/XML/1998/namespace"/>
-    <ds:schemaRef ds:uri="http://purl.org/dc/dcmitype/"/>
-  </ds:schemaRefs>
-</ds:datastoreItem>
 </file>
</xml_diff>

<commit_message>
FHIR-46374 - Add support for US Core 6.1.0 in addition to 3.1.1
</commit_message>
<xml_diff>
--- a/input/images/CARIN_BB_Profile_Relationship_Diagram.pptx
+++ b/input/images/CARIN_BB_Profile_Relationship_Diagram.pptx
@@ -9446,7 +9446,7 @@
         <p:spPr>
           <a:xfrm>
             <a:off x="3247947" y="4083138"/>
-            <a:ext cx="2509233" cy="1292964"/>
+            <a:ext cx="2509233" cy="1414634"/>
           </a:xfrm>
           <a:prstGeom prst="roundRect">
             <a:avLst/>
@@ -9534,6 +9534,20 @@
               <a:t>Professional/Non-Clinician</a:t>
             </a:r>
           </a:p>
+          <a:p>
+            <a:pPr algn="ctr" defTabSz="1216152">
+              <a:defRPr/>
+            </a:pPr>
+            <a:r>
+              <a:rPr lang="en-US" sz="1463" kern="0" dirty="0">
+                <a:solidFill>
+                  <a:sysClr val="windowText" lastClr="000000"/>
+                </a:solidFill>
+                <a:latin typeface="Calibri Light"/>
+              </a:rPr>
+              <a:t>Oral</a:t>
+            </a:r>
+          </a:p>
         </p:txBody>
       </p:sp>
       <p:cxnSp>
@@ -9553,9 +9567,9 @@
           <p:nvPr/>
         </p:nvCxnSpPr>
         <p:spPr>
-          <a:xfrm flipH="1">
-            <a:off x="2134007" y="4729621"/>
-            <a:ext cx="1113940" cy="2270"/>
+          <a:xfrm flipH="1" flipV="1">
+            <a:off x="2134007" y="4731891"/>
+            <a:ext cx="1113940" cy="58564"/>
           </a:xfrm>
           <a:prstGeom prst="straightConnector1">
             <a:avLst/>
@@ -9645,8 +9659,8 @@
         </p:nvCxnSpPr>
         <p:spPr>
           <a:xfrm flipH="1" flipV="1">
-            <a:off x="3049881" y="3095949"/>
-            <a:ext cx="1452684" cy="987189"/>
+            <a:off x="3049881" y="3095950"/>
+            <a:ext cx="1452683" cy="987188"/>
           </a:xfrm>
           <a:prstGeom prst="straightConnector1">
             <a:avLst/>
@@ -9680,171 +9694,6 @@
           <a:xfrm>
             <a:off x="442119" y="1143000"/>
             <a:ext cx="2073869" cy="643774"/>
-          </a:xfrm>
-          <a:prstGeom prst="roundRect">
-            <a:avLst/>
-          </a:prstGeom>
-          <a:solidFill>
-            <a:srgbClr val="687DA1">
-              <a:lumMod val="20000"/>
-              <a:lumOff val="80000"/>
-            </a:srgbClr>
-          </a:solidFill>
-          <a:ln w="6350" cap="flat" cmpd="sng" algn="ctr">
-            <a:solidFill>
-              <a:srgbClr val="687DA1"/>
-            </a:solidFill>
-            <a:prstDash val="solid"/>
-            <a:miter lim="800000"/>
-          </a:ln>
-          <a:effectLst/>
-        </p:spPr>
-        <p:txBody>
-          <a:bodyPr rtlCol="0" anchor="ctr"/>
-          <a:lstStyle/>
-          <a:p>
-            <a:pPr algn="ctr" defTabSz="1216152">
-              <a:defRPr/>
-            </a:pPr>
-            <a:r>
-              <a:rPr lang="en-US" sz="2128" kern="0" dirty="0">
-                <a:solidFill>
-                  <a:sysClr val="windowText" lastClr="000000"/>
-                </a:solidFill>
-                <a:latin typeface="Calibri Light"/>
-              </a:rPr>
-              <a:t>Coverage</a:t>
-            </a:r>
-          </a:p>
-        </p:txBody>
-      </p:sp>
-      <p:cxnSp>
-        <p:nvCxnSpPr>
-          <p:cNvPr id="13" name="Straight Arrow Connector 12">
-            <a:extLst>
-              <a:ext uri="{FF2B5EF4-FFF2-40B4-BE49-F238E27FC236}">
-                <a16:creationId xmlns:a16="http://schemas.microsoft.com/office/drawing/2014/main" id="{70991D55-4A2B-44CE-BB0D-A7C2E0D17AC7}"/>
-              </a:ext>
-            </a:extLst>
-          </p:cNvPr>
-          <p:cNvCxnSpPr>
-            <a:cxnSpLocks/>
-            <a:stCxn id="8" idx="3"/>
-            <a:endCxn id="32" idx="1"/>
-          </p:cNvCxnSpPr>
-          <p:nvPr/>
-        </p:nvCxnSpPr>
-        <p:spPr>
-          <a:xfrm>
-            <a:off x="5757180" y="4729620"/>
-            <a:ext cx="1125596" cy="230389"/>
-          </a:xfrm>
-          <a:prstGeom prst="straightConnector1">
-            <a:avLst/>
-          </a:prstGeom>
-          <a:noFill/>
-          <a:ln w="12700" cap="flat" cmpd="sng" algn="ctr">
-            <a:solidFill>
-              <a:srgbClr val="687DA1"/>
-            </a:solidFill>
-            <a:prstDash val="solid"/>
-            <a:miter lim="800000"/>
-            <a:headEnd type="none" w="lg" len="lg"/>
-            <a:tailEnd type="triangle" w="lg" len="lg"/>
-          </a:ln>
-          <a:effectLst/>
-        </p:spPr>
-      </p:cxnSp>
-      <p:cxnSp>
-        <p:nvCxnSpPr>
-          <p:cNvPr id="15" name="Straight Arrow Connector 14">
-            <a:extLst>
-              <a:ext uri="{FF2B5EF4-FFF2-40B4-BE49-F238E27FC236}">
-                <a16:creationId xmlns:a16="http://schemas.microsoft.com/office/drawing/2014/main" id="{31E1828E-5C22-474B-89D3-93AFD56CF131}"/>
-              </a:ext>
-            </a:extLst>
-          </p:cNvPr>
-          <p:cNvCxnSpPr>
-            <a:cxnSpLocks/>
-            <a:stCxn id="12" idx="2"/>
-            <a:endCxn id="10" idx="0"/>
-          </p:cNvCxnSpPr>
-          <p:nvPr/>
-        </p:nvCxnSpPr>
-        <p:spPr>
-          <a:xfrm flipH="1">
-            <a:off x="1464835" y="1786774"/>
-            <a:ext cx="14219" cy="2623230"/>
-          </a:xfrm>
-          <a:prstGeom prst="straightConnector1">
-            <a:avLst/>
-          </a:prstGeom>
-          <a:noFill/>
-          <a:ln w="12700" cap="flat" cmpd="sng" algn="ctr">
-            <a:solidFill>
-              <a:srgbClr val="687DA1"/>
-            </a:solidFill>
-            <a:prstDash val="solid"/>
-            <a:miter lim="800000"/>
-            <a:headEnd type="none" w="lg" len="lg"/>
-            <a:tailEnd type="triangle" w="lg" len="lg"/>
-          </a:ln>
-          <a:effectLst/>
-        </p:spPr>
-      </p:cxnSp>
-      <p:cxnSp>
-        <p:nvCxnSpPr>
-          <p:cNvPr id="16" name="Straight Arrow Connector 15">
-            <a:extLst>
-              <a:ext uri="{FF2B5EF4-FFF2-40B4-BE49-F238E27FC236}">
-                <a16:creationId xmlns:a16="http://schemas.microsoft.com/office/drawing/2014/main" id="{4B3EF179-19D2-4243-BB86-1AD58F952B50}"/>
-              </a:ext>
-            </a:extLst>
-          </p:cNvPr>
-          <p:cNvCxnSpPr>
-            <a:cxnSpLocks/>
-            <a:stCxn id="12" idx="3"/>
-            <a:endCxn id="17" idx="1"/>
-          </p:cNvCxnSpPr>
-          <p:nvPr/>
-        </p:nvCxnSpPr>
-        <p:spPr>
-          <a:xfrm>
-            <a:off x="2515987" y="1464887"/>
-            <a:ext cx="1676799" cy="4638"/>
-          </a:xfrm>
-          <a:prstGeom prst="straightConnector1">
-            <a:avLst/>
-          </a:prstGeom>
-          <a:noFill/>
-          <a:ln w="12700" cap="flat" cmpd="sng" algn="ctr">
-            <a:solidFill>
-              <a:srgbClr val="687DA1"/>
-            </a:solidFill>
-            <a:prstDash val="solid"/>
-            <a:miter lim="800000"/>
-            <a:headEnd type="none" w="lg" len="lg"/>
-            <a:tailEnd type="triangle" w="lg" len="lg"/>
-          </a:ln>
-          <a:effectLst/>
-        </p:spPr>
-      </p:cxnSp>
-      <p:sp>
-        <p:nvSpPr>
-          <p:cNvPr id="17" name="Rounded Rectangle 26">
-            <a:extLst>
-              <a:ext uri="{FF2B5EF4-FFF2-40B4-BE49-F238E27FC236}">
-                <a16:creationId xmlns:a16="http://schemas.microsoft.com/office/drawing/2014/main" id="{158F9E32-3912-4CE8-B9D3-D10B69FFDA7B}"/>
-              </a:ext>
-            </a:extLst>
-          </p:cNvPr>
-          <p:cNvSpPr/>
-          <p:nvPr/>
-        </p:nvSpPr>
-        <p:spPr>
-          <a:xfrm>
-            <a:off x="4192786" y="1147637"/>
-            <a:ext cx="1338345" cy="643774"/>
           </a:xfrm>
           <a:prstGeom prst="roundRect">
             <a:avLst/>
@@ -9872,306 +9721,37 @@
               <a:defRPr/>
             </a:pPr>
             <a:r>
-              <a:rPr lang="en-US" sz="1463" kern="0" dirty="0">
+              <a:rPr lang="en-US" sz="2128" kern="0" dirty="0">
                 <a:solidFill>
                   <a:sysClr val="windowText" lastClr="000000"/>
                 </a:solidFill>
                 <a:latin typeface="Calibri Light"/>
               </a:rPr>
-              <a:t>Organization</a:t>
-            </a:r>
-          </a:p>
-        </p:txBody>
-      </p:sp>
-      <p:sp>
-        <p:nvSpPr>
-          <p:cNvPr id="18" name="TextBox 17">
-            <a:extLst>
-              <a:ext uri="{FF2B5EF4-FFF2-40B4-BE49-F238E27FC236}">
-                <a16:creationId xmlns:a16="http://schemas.microsoft.com/office/drawing/2014/main" id="{CA159809-47EF-4473-9BE6-A7D46F47E58D}"/>
-              </a:ext>
-            </a:extLst>
-          </p:cNvPr>
-          <p:cNvSpPr txBox="1"/>
-          <p:nvPr/>
-        </p:nvSpPr>
-        <p:spPr>
-          <a:xfrm>
-            <a:off x="2834511" y="825395"/>
-            <a:ext cx="2922669" cy="619080"/>
-          </a:xfrm>
-          <a:prstGeom prst="rect">
-            <a:avLst/>
-          </a:prstGeom>
-          <a:noFill/>
-        </p:spPr>
-        <p:txBody>
-          <a:bodyPr wrap="square" rtlCol="0">
-            <a:spAutoFit/>
-          </a:bodyPr>
-          <a:lstStyle/>
-          <a:p>
-            <a:pPr defTabSz="1216152">
-              <a:lnSpc>
-                <a:spcPct val="70000"/>
-              </a:lnSpc>
-              <a:defRPr/>
-            </a:pPr>
-            <a:r>
-              <a:rPr lang="en-US" sz="1596" kern="0" dirty="0">
-                <a:solidFill>
-                  <a:prstClr val="black"/>
-                </a:solidFill>
-                <a:latin typeface="Calibri Light"/>
-              </a:rPr>
-              <a:t>(focal=true)</a:t>
-            </a:r>
-          </a:p>
-          <a:p>
-            <a:pPr defTabSz="1216152">
-              <a:lnSpc>
-                <a:spcPct val="70000"/>
-              </a:lnSpc>
-              <a:defRPr/>
-            </a:pPr>
-            <a:r>
-              <a:rPr lang="en-US" sz="1596" kern="0" dirty="0">
-                <a:solidFill>
-                  <a:prstClr val="black"/>
-                </a:solidFill>
-                <a:latin typeface="Calibri Light"/>
-              </a:rPr>
-              <a:t>payor</a:t>
-            </a:r>
-          </a:p>
-          <a:p>
-            <a:pPr defTabSz="1216152">
-              <a:lnSpc>
-                <a:spcPct val="70000"/>
-              </a:lnSpc>
-              <a:defRPr/>
-            </a:pPr>
-            <a:r>
-              <a:rPr lang="en-US" sz="1596" kern="0" dirty="0">
-                <a:solidFill>
-                  <a:prstClr val="black"/>
-                </a:solidFill>
-                <a:latin typeface="Calibri Light"/>
-              </a:rPr>
-              <a:t>1..1</a:t>
-            </a:r>
-          </a:p>
-        </p:txBody>
-      </p:sp>
-      <p:sp>
-        <p:nvSpPr>
-          <p:cNvPr id="19" name="TextBox 18">
-            <a:extLst>
-              <a:ext uri="{FF2B5EF4-FFF2-40B4-BE49-F238E27FC236}">
-                <a16:creationId xmlns:a16="http://schemas.microsoft.com/office/drawing/2014/main" id="{68289AEA-D140-458E-963F-872683FA23F6}"/>
-              </a:ext>
-            </a:extLst>
-          </p:cNvPr>
-          <p:cNvSpPr txBox="1"/>
-          <p:nvPr/>
-        </p:nvSpPr>
-        <p:spPr>
-          <a:xfrm>
-            <a:off x="391458" y="2270646"/>
-            <a:ext cx="1091966" cy="447174"/>
-          </a:xfrm>
-          <a:prstGeom prst="rect">
-            <a:avLst/>
-          </a:prstGeom>
-          <a:noFill/>
-        </p:spPr>
-        <p:txBody>
-          <a:bodyPr wrap="none" rtlCol="0">
-            <a:spAutoFit/>
-          </a:bodyPr>
-          <a:lstStyle/>
-          <a:p>
-            <a:pPr defTabSz="1216152">
-              <a:lnSpc>
-                <a:spcPct val="70000"/>
-              </a:lnSpc>
-              <a:defRPr/>
-            </a:pPr>
-            <a:r>
-              <a:rPr lang="en-US" sz="1596" kern="0" dirty="0">
-                <a:solidFill>
-                  <a:prstClr val="black"/>
-                </a:solidFill>
-                <a:latin typeface="Calibri Light"/>
-              </a:rPr>
-              <a:t>beneficiary</a:t>
-            </a:r>
-          </a:p>
-          <a:p>
-            <a:pPr algn="ctr" defTabSz="1216152">
-              <a:lnSpc>
-                <a:spcPct val="70000"/>
-              </a:lnSpc>
-              <a:defRPr/>
-            </a:pPr>
-            <a:r>
-              <a:rPr lang="en-US" sz="1596" kern="0" dirty="0">
-                <a:solidFill>
-                  <a:prstClr val="black"/>
-                </a:solidFill>
-                <a:latin typeface="Calibri Light"/>
-              </a:rPr>
-              <a:t>1..1</a:t>
-            </a:r>
-          </a:p>
-        </p:txBody>
-      </p:sp>
-      <p:sp>
-        <p:nvSpPr>
-          <p:cNvPr id="20" name="TextBox 19">
-            <a:extLst>
-              <a:ext uri="{FF2B5EF4-FFF2-40B4-BE49-F238E27FC236}">
-                <a16:creationId xmlns:a16="http://schemas.microsoft.com/office/drawing/2014/main" id="{9DF0371E-8C92-4F08-B34C-B124A1A2E254}"/>
-              </a:ext>
-            </a:extLst>
-          </p:cNvPr>
-          <p:cNvSpPr txBox="1"/>
-          <p:nvPr/>
-        </p:nvSpPr>
-        <p:spPr>
-          <a:xfrm>
-            <a:off x="2423365" y="3296794"/>
-            <a:ext cx="979755" cy="447174"/>
-          </a:xfrm>
-          <a:prstGeom prst="rect">
-            <a:avLst/>
-          </a:prstGeom>
-          <a:noFill/>
-        </p:spPr>
-        <p:txBody>
-          <a:bodyPr wrap="none" rtlCol="0">
-            <a:spAutoFit/>
-          </a:bodyPr>
-          <a:lstStyle/>
-          <a:p>
-            <a:pPr algn="ctr" defTabSz="1216152">
-              <a:lnSpc>
-                <a:spcPct val="70000"/>
-              </a:lnSpc>
-              <a:defRPr/>
-            </a:pPr>
-            <a:r>
-              <a:rPr lang="en-US" sz="1596" kern="0" dirty="0">
-                <a:solidFill>
-                  <a:prstClr val="black"/>
-                </a:solidFill>
-                <a:latin typeface="Calibri Light"/>
-              </a:rPr>
-              <a:t>insurance</a:t>
-            </a:r>
-          </a:p>
-          <a:p>
-            <a:pPr algn="ctr" defTabSz="1216152">
-              <a:lnSpc>
-                <a:spcPct val="70000"/>
-              </a:lnSpc>
-              <a:defRPr/>
-            </a:pPr>
-            <a:r>
-              <a:rPr lang="en-US" sz="1596" kern="0" dirty="0">
-                <a:solidFill>
-                  <a:prstClr val="black"/>
-                </a:solidFill>
-                <a:latin typeface="Calibri Light"/>
-              </a:rPr>
-              <a:t>1..*</a:t>
-            </a:r>
-          </a:p>
-        </p:txBody>
-      </p:sp>
-      <p:sp>
-        <p:nvSpPr>
-          <p:cNvPr id="21" name="TextBox 20">
-            <a:extLst>
-              <a:ext uri="{FF2B5EF4-FFF2-40B4-BE49-F238E27FC236}">
-                <a16:creationId xmlns:a16="http://schemas.microsoft.com/office/drawing/2014/main" id="{FF6045D6-B830-45DA-AB3D-F98EE2A87EAA}"/>
-              </a:ext>
-            </a:extLst>
-          </p:cNvPr>
-          <p:cNvSpPr txBox="1"/>
-          <p:nvPr/>
-        </p:nvSpPr>
-        <p:spPr>
-          <a:xfrm>
-            <a:off x="5827711" y="4948724"/>
-            <a:ext cx="997389" cy="447174"/>
-          </a:xfrm>
-          <a:prstGeom prst="rect">
-            <a:avLst/>
-          </a:prstGeom>
-          <a:noFill/>
-        </p:spPr>
-        <p:txBody>
-          <a:bodyPr wrap="none" rtlCol="0">
-            <a:spAutoFit/>
-          </a:bodyPr>
-          <a:lstStyle/>
-          <a:p>
-            <a:pPr defTabSz="1216152">
-              <a:lnSpc>
-                <a:spcPct val="70000"/>
-              </a:lnSpc>
-              <a:defRPr/>
-            </a:pPr>
-            <a:r>
-              <a:rPr lang="en-US" sz="1596" kern="0" dirty="0">
-                <a:solidFill>
-                  <a:prstClr val="black"/>
-                </a:solidFill>
-                <a:latin typeface="Calibri Light"/>
-              </a:rPr>
-              <a:t>careTeam</a:t>
-            </a:r>
-          </a:p>
-          <a:p>
-            <a:pPr algn="ctr" defTabSz="1216152">
-              <a:lnSpc>
-                <a:spcPct val="70000"/>
-              </a:lnSpc>
-              <a:defRPr/>
-            </a:pPr>
-            <a:r>
-              <a:rPr lang="en-US" sz="1596" kern="0" dirty="0">
-                <a:solidFill>
-                  <a:prstClr val="black"/>
-                </a:solidFill>
-                <a:latin typeface="Calibri Light"/>
-              </a:rPr>
-              <a:t>1..*</a:t>
+              <a:t>Coverage</a:t>
             </a:r>
           </a:p>
         </p:txBody>
       </p:sp>
       <p:cxnSp>
         <p:nvCxnSpPr>
-          <p:cNvPr id="22" name="Straight Arrow Connector 21">
-            <a:extLst>
-              <a:ext uri="{FF2B5EF4-FFF2-40B4-BE49-F238E27FC236}">
-                <a16:creationId xmlns:a16="http://schemas.microsoft.com/office/drawing/2014/main" id="{19584F12-268F-47F4-895E-EFFEB17B1E9B}"/>
+          <p:cNvPr id="13" name="Straight Arrow Connector 12">
+            <a:extLst>
+              <a:ext uri="{FF2B5EF4-FFF2-40B4-BE49-F238E27FC236}">
+                <a16:creationId xmlns:a16="http://schemas.microsoft.com/office/drawing/2014/main" id="{70991D55-4A2B-44CE-BB0D-A7C2E0D17AC7}"/>
               </a:ext>
             </a:extLst>
           </p:cNvPr>
           <p:cNvCxnSpPr>
             <a:cxnSpLocks/>
             <a:stCxn id="8" idx="3"/>
-            <a:endCxn id="7" idx="1"/>
+            <a:endCxn id="32" idx="1"/>
           </p:cNvCxnSpPr>
           <p:nvPr/>
         </p:nvCxnSpPr>
         <p:spPr>
-          <a:xfrm flipV="1">
-            <a:off x="5757180" y="2139225"/>
-            <a:ext cx="2592556" cy="2590396"/>
+          <a:xfrm>
+            <a:off x="5757180" y="4790455"/>
+            <a:ext cx="1125596" cy="169554"/>
           </a:xfrm>
           <a:prstGeom prst="straightConnector1">
             <a:avLst/>
@@ -10189,12 +9769,86 @@
           <a:effectLst/>
         </p:spPr>
       </p:cxnSp>
+      <p:cxnSp>
+        <p:nvCxnSpPr>
+          <p:cNvPr id="15" name="Straight Arrow Connector 14">
+            <a:extLst>
+              <a:ext uri="{FF2B5EF4-FFF2-40B4-BE49-F238E27FC236}">
+                <a16:creationId xmlns:a16="http://schemas.microsoft.com/office/drawing/2014/main" id="{31E1828E-5C22-474B-89D3-93AFD56CF131}"/>
+              </a:ext>
+            </a:extLst>
+          </p:cNvPr>
+          <p:cNvCxnSpPr>
+            <a:cxnSpLocks/>
+            <a:stCxn id="12" idx="2"/>
+            <a:endCxn id="10" idx="0"/>
+          </p:cNvCxnSpPr>
+          <p:nvPr/>
+        </p:nvCxnSpPr>
+        <p:spPr>
+          <a:xfrm flipH="1">
+            <a:off x="1464835" y="1786774"/>
+            <a:ext cx="14219" cy="2623230"/>
+          </a:xfrm>
+          <a:prstGeom prst="straightConnector1">
+            <a:avLst/>
+          </a:prstGeom>
+          <a:noFill/>
+          <a:ln w="12700" cap="flat" cmpd="sng" algn="ctr">
+            <a:solidFill>
+              <a:srgbClr val="687DA1"/>
+            </a:solidFill>
+            <a:prstDash val="solid"/>
+            <a:miter lim="800000"/>
+            <a:headEnd type="none" w="lg" len="lg"/>
+            <a:tailEnd type="triangle" w="lg" len="lg"/>
+          </a:ln>
+          <a:effectLst/>
+        </p:spPr>
+      </p:cxnSp>
+      <p:cxnSp>
+        <p:nvCxnSpPr>
+          <p:cNvPr id="16" name="Straight Arrow Connector 15">
+            <a:extLst>
+              <a:ext uri="{FF2B5EF4-FFF2-40B4-BE49-F238E27FC236}">
+                <a16:creationId xmlns:a16="http://schemas.microsoft.com/office/drawing/2014/main" id="{4B3EF179-19D2-4243-BB86-1AD58F952B50}"/>
+              </a:ext>
+            </a:extLst>
+          </p:cNvPr>
+          <p:cNvCxnSpPr>
+            <a:cxnSpLocks/>
+            <a:stCxn id="12" idx="3"/>
+            <a:endCxn id="17" idx="1"/>
+          </p:cNvCxnSpPr>
+          <p:nvPr/>
+        </p:nvCxnSpPr>
+        <p:spPr>
+          <a:xfrm>
+            <a:off x="2515987" y="1464887"/>
+            <a:ext cx="1676799" cy="4638"/>
+          </a:xfrm>
+          <a:prstGeom prst="straightConnector1">
+            <a:avLst/>
+          </a:prstGeom>
+          <a:noFill/>
+          <a:ln w="12700" cap="flat" cmpd="sng" algn="ctr">
+            <a:solidFill>
+              <a:srgbClr val="687DA1"/>
+            </a:solidFill>
+            <a:prstDash val="solid"/>
+            <a:miter lim="800000"/>
+            <a:headEnd type="none" w="lg" len="lg"/>
+            <a:tailEnd type="triangle" w="lg" len="lg"/>
+          </a:ln>
+          <a:effectLst/>
+        </p:spPr>
+      </p:cxnSp>
       <p:sp>
         <p:nvSpPr>
-          <p:cNvPr id="23" name="Rounded Rectangle 26">
-            <a:extLst>
-              <a:ext uri="{FF2B5EF4-FFF2-40B4-BE49-F238E27FC236}">
-                <a16:creationId xmlns:a16="http://schemas.microsoft.com/office/drawing/2014/main" id="{17CBB9DD-75A5-4C1A-9C72-5CB6B2E109E5}"/>
+          <p:cNvPr id="17" name="Rounded Rectangle 26">
+            <a:extLst>
+              <a:ext uri="{FF2B5EF4-FFF2-40B4-BE49-F238E27FC236}">
+                <a16:creationId xmlns:a16="http://schemas.microsoft.com/office/drawing/2014/main" id="{158F9E32-3912-4CE8-B9D3-D10B69FFDA7B}"/>
               </a:ext>
             </a:extLst>
           </p:cNvPr>
@@ -10203,8 +9857,8 @@
         </p:nvSpPr>
         <p:spPr>
           <a:xfrm>
-            <a:off x="8462743" y="2283153"/>
-            <a:ext cx="1586707" cy="643774"/>
+            <a:off x="4192786" y="1147637"/>
+            <a:ext cx="1338345" cy="643774"/>
           </a:xfrm>
           <a:prstGeom prst="roundRect">
             <a:avLst/>
@@ -10232,6 +9886,366 @@
               <a:defRPr/>
             </a:pPr>
             <a:r>
+              <a:rPr lang="en-US" sz="1463" kern="0" dirty="0">
+                <a:solidFill>
+                  <a:sysClr val="windowText" lastClr="000000"/>
+                </a:solidFill>
+                <a:latin typeface="Calibri Light"/>
+              </a:rPr>
+              <a:t>Organization</a:t>
+            </a:r>
+          </a:p>
+        </p:txBody>
+      </p:sp>
+      <p:sp>
+        <p:nvSpPr>
+          <p:cNvPr id="18" name="TextBox 17">
+            <a:extLst>
+              <a:ext uri="{FF2B5EF4-FFF2-40B4-BE49-F238E27FC236}">
+                <a16:creationId xmlns:a16="http://schemas.microsoft.com/office/drawing/2014/main" id="{CA159809-47EF-4473-9BE6-A7D46F47E58D}"/>
+              </a:ext>
+            </a:extLst>
+          </p:cNvPr>
+          <p:cNvSpPr txBox="1"/>
+          <p:nvPr/>
+        </p:nvSpPr>
+        <p:spPr>
+          <a:xfrm>
+            <a:off x="2834511" y="825395"/>
+            <a:ext cx="2922669" cy="619080"/>
+          </a:xfrm>
+          <a:prstGeom prst="rect">
+            <a:avLst/>
+          </a:prstGeom>
+          <a:noFill/>
+        </p:spPr>
+        <p:txBody>
+          <a:bodyPr wrap="square" rtlCol="0">
+            <a:spAutoFit/>
+          </a:bodyPr>
+          <a:lstStyle/>
+          <a:p>
+            <a:pPr defTabSz="1216152">
+              <a:lnSpc>
+                <a:spcPct val="70000"/>
+              </a:lnSpc>
+              <a:defRPr/>
+            </a:pPr>
+            <a:r>
+              <a:rPr lang="en-US" sz="1596" kern="0" dirty="0">
+                <a:solidFill>
+                  <a:prstClr val="black"/>
+                </a:solidFill>
+                <a:latin typeface="Calibri Light"/>
+              </a:rPr>
+              <a:t>(focal=true)</a:t>
+            </a:r>
+          </a:p>
+          <a:p>
+            <a:pPr defTabSz="1216152">
+              <a:lnSpc>
+                <a:spcPct val="70000"/>
+              </a:lnSpc>
+              <a:defRPr/>
+            </a:pPr>
+            <a:r>
+              <a:rPr lang="en-US" sz="1596" kern="0" dirty="0">
+                <a:solidFill>
+                  <a:prstClr val="black"/>
+                </a:solidFill>
+                <a:latin typeface="Calibri Light"/>
+              </a:rPr>
+              <a:t>payor</a:t>
+            </a:r>
+          </a:p>
+          <a:p>
+            <a:pPr defTabSz="1216152">
+              <a:lnSpc>
+                <a:spcPct val="70000"/>
+              </a:lnSpc>
+              <a:defRPr/>
+            </a:pPr>
+            <a:r>
+              <a:rPr lang="en-US" sz="1596" kern="0" dirty="0">
+                <a:solidFill>
+                  <a:prstClr val="black"/>
+                </a:solidFill>
+                <a:latin typeface="Calibri Light"/>
+              </a:rPr>
+              <a:t>1..1</a:t>
+            </a:r>
+          </a:p>
+        </p:txBody>
+      </p:sp>
+      <p:sp>
+        <p:nvSpPr>
+          <p:cNvPr id="19" name="TextBox 18">
+            <a:extLst>
+              <a:ext uri="{FF2B5EF4-FFF2-40B4-BE49-F238E27FC236}">
+                <a16:creationId xmlns:a16="http://schemas.microsoft.com/office/drawing/2014/main" id="{68289AEA-D140-458E-963F-872683FA23F6}"/>
+              </a:ext>
+            </a:extLst>
+          </p:cNvPr>
+          <p:cNvSpPr txBox="1"/>
+          <p:nvPr/>
+        </p:nvSpPr>
+        <p:spPr>
+          <a:xfrm>
+            <a:off x="391458" y="2270646"/>
+            <a:ext cx="1091966" cy="447174"/>
+          </a:xfrm>
+          <a:prstGeom prst="rect">
+            <a:avLst/>
+          </a:prstGeom>
+          <a:noFill/>
+        </p:spPr>
+        <p:txBody>
+          <a:bodyPr wrap="none" rtlCol="0">
+            <a:spAutoFit/>
+          </a:bodyPr>
+          <a:lstStyle/>
+          <a:p>
+            <a:pPr defTabSz="1216152">
+              <a:lnSpc>
+                <a:spcPct val="70000"/>
+              </a:lnSpc>
+              <a:defRPr/>
+            </a:pPr>
+            <a:r>
+              <a:rPr lang="en-US" sz="1596" kern="0" dirty="0">
+                <a:solidFill>
+                  <a:prstClr val="black"/>
+                </a:solidFill>
+                <a:latin typeface="Calibri Light"/>
+              </a:rPr>
+              <a:t>beneficiary</a:t>
+            </a:r>
+          </a:p>
+          <a:p>
+            <a:pPr algn="ctr" defTabSz="1216152">
+              <a:lnSpc>
+                <a:spcPct val="70000"/>
+              </a:lnSpc>
+              <a:defRPr/>
+            </a:pPr>
+            <a:r>
+              <a:rPr lang="en-US" sz="1596" kern="0" dirty="0">
+                <a:solidFill>
+                  <a:prstClr val="black"/>
+                </a:solidFill>
+                <a:latin typeface="Calibri Light"/>
+              </a:rPr>
+              <a:t>1..1</a:t>
+            </a:r>
+          </a:p>
+        </p:txBody>
+      </p:sp>
+      <p:sp>
+        <p:nvSpPr>
+          <p:cNvPr id="20" name="TextBox 19">
+            <a:extLst>
+              <a:ext uri="{FF2B5EF4-FFF2-40B4-BE49-F238E27FC236}">
+                <a16:creationId xmlns:a16="http://schemas.microsoft.com/office/drawing/2014/main" id="{9DF0371E-8C92-4F08-B34C-B124A1A2E254}"/>
+              </a:ext>
+            </a:extLst>
+          </p:cNvPr>
+          <p:cNvSpPr txBox="1"/>
+          <p:nvPr/>
+        </p:nvSpPr>
+        <p:spPr>
+          <a:xfrm>
+            <a:off x="2423365" y="3296794"/>
+            <a:ext cx="979755" cy="447174"/>
+          </a:xfrm>
+          <a:prstGeom prst="rect">
+            <a:avLst/>
+          </a:prstGeom>
+          <a:noFill/>
+        </p:spPr>
+        <p:txBody>
+          <a:bodyPr wrap="none" rtlCol="0">
+            <a:spAutoFit/>
+          </a:bodyPr>
+          <a:lstStyle/>
+          <a:p>
+            <a:pPr algn="ctr" defTabSz="1216152">
+              <a:lnSpc>
+                <a:spcPct val="70000"/>
+              </a:lnSpc>
+              <a:defRPr/>
+            </a:pPr>
+            <a:r>
+              <a:rPr lang="en-US" sz="1596" kern="0" dirty="0">
+                <a:solidFill>
+                  <a:prstClr val="black"/>
+                </a:solidFill>
+                <a:latin typeface="Calibri Light"/>
+              </a:rPr>
+              <a:t>insurance</a:t>
+            </a:r>
+          </a:p>
+          <a:p>
+            <a:pPr algn="ctr" defTabSz="1216152">
+              <a:lnSpc>
+                <a:spcPct val="70000"/>
+              </a:lnSpc>
+              <a:defRPr/>
+            </a:pPr>
+            <a:r>
+              <a:rPr lang="en-US" sz="1596" kern="0" dirty="0">
+                <a:solidFill>
+                  <a:prstClr val="black"/>
+                </a:solidFill>
+                <a:latin typeface="Calibri Light"/>
+              </a:rPr>
+              <a:t>1..*</a:t>
+            </a:r>
+          </a:p>
+        </p:txBody>
+      </p:sp>
+      <p:sp>
+        <p:nvSpPr>
+          <p:cNvPr id="21" name="TextBox 20">
+            <a:extLst>
+              <a:ext uri="{FF2B5EF4-FFF2-40B4-BE49-F238E27FC236}">
+                <a16:creationId xmlns:a16="http://schemas.microsoft.com/office/drawing/2014/main" id="{FF6045D6-B830-45DA-AB3D-F98EE2A87EAA}"/>
+              </a:ext>
+            </a:extLst>
+          </p:cNvPr>
+          <p:cNvSpPr txBox="1"/>
+          <p:nvPr/>
+        </p:nvSpPr>
+        <p:spPr>
+          <a:xfrm>
+            <a:off x="5827711" y="4948724"/>
+            <a:ext cx="997389" cy="447174"/>
+          </a:xfrm>
+          <a:prstGeom prst="rect">
+            <a:avLst/>
+          </a:prstGeom>
+          <a:noFill/>
+        </p:spPr>
+        <p:txBody>
+          <a:bodyPr wrap="none" rtlCol="0">
+            <a:spAutoFit/>
+          </a:bodyPr>
+          <a:lstStyle/>
+          <a:p>
+            <a:pPr defTabSz="1216152">
+              <a:lnSpc>
+                <a:spcPct val="70000"/>
+              </a:lnSpc>
+              <a:defRPr/>
+            </a:pPr>
+            <a:r>
+              <a:rPr lang="en-US" sz="1596" kern="0" dirty="0">
+                <a:solidFill>
+                  <a:prstClr val="black"/>
+                </a:solidFill>
+                <a:latin typeface="Calibri Light"/>
+              </a:rPr>
+              <a:t>careTeam</a:t>
+            </a:r>
+          </a:p>
+          <a:p>
+            <a:pPr algn="ctr" defTabSz="1216152">
+              <a:lnSpc>
+                <a:spcPct val="70000"/>
+              </a:lnSpc>
+              <a:defRPr/>
+            </a:pPr>
+            <a:r>
+              <a:rPr lang="en-US" sz="1596" kern="0" dirty="0">
+                <a:solidFill>
+                  <a:prstClr val="black"/>
+                </a:solidFill>
+                <a:latin typeface="Calibri Light"/>
+              </a:rPr>
+              <a:t>1..*</a:t>
+            </a:r>
+          </a:p>
+        </p:txBody>
+      </p:sp>
+      <p:cxnSp>
+        <p:nvCxnSpPr>
+          <p:cNvPr id="22" name="Straight Arrow Connector 21">
+            <a:extLst>
+              <a:ext uri="{FF2B5EF4-FFF2-40B4-BE49-F238E27FC236}">
+                <a16:creationId xmlns:a16="http://schemas.microsoft.com/office/drawing/2014/main" id="{19584F12-268F-47F4-895E-EFFEB17B1E9B}"/>
+              </a:ext>
+            </a:extLst>
+          </p:cNvPr>
+          <p:cNvCxnSpPr>
+            <a:cxnSpLocks/>
+            <a:stCxn id="8" idx="3"/>
+            <a:endCxn id="7" idx="1"/>
+          </p:cNvCxnSpPr>
+          <p:nvPr/>
+        </p:nvCxnSpPr>
+        <p:spPr>
+          <a:xfrm flipV="1">
+            <a:off x="5757180" y="2139225"/>
+            <a:ext cx="2592556" cy="2651230"/>
+          </a:xfrm>
+          <a:prstGeom prst="straightConnector1">
+            <a:avLst/>
+          </a:prstGeom>
+          <a:noFill/>
+          <a:ln w="12700" cap="flat" cmpd="sng" algn="ctr">
+            <a:solidFill>
+              <a:srgbClr val="687DA1"/>
+            </a:solidFill>
+            <a:prstDash val="solid"/>
+            <a:miter lim="800000"/>
+            <a:headEnd type="none" w="lg" len="lg"/>
+            <a:tailEnd type="triangle" w="lg" len="lg"/>
+          </a:ln>
+          <a:effectLst/>
+        </p:spPr>
+      </p:cxnSp>
+      <p:sp>
+        <p:nvSpPr>
+          <p:cNvPr id="23" name="Rounded Rectangle 26">
+            <a:extLst>
+              <a:ext uri="{FF2B5EF4-FFF2-40B4-BE49-F238E27FC236}">
+                <a16:creationId xmlns:a16="http://schemas.microsoft.com/office/drawing/2014/main" id="{17CBB9DD-75A5-4C1A-9C72-5CB6B2E109E5}"/>
+              </a:ext>
+            </a:extLst>
+          </p:cNvPr>
+          <p:cNvSpPr/>
+          <p:nvPr/>
+        </p:nvSpPr>
+        <p:spPr>
+          <a:xfrm>
+            <a:off x="8462743" y="2283153"/>
+            <a:ext cx="1586707" cy="643774"/>
+          </a:xfrm>
+          <a:prstGeom prst="roundRect">
+            <a:avLst/>
+          </a:prstGeom>
+          <a:solidFill>
+            <a:srgbClr val="687DA1">
+              <a:lumMod val="20000"/>
+              <a:lumOff val="80000"/>
+            </a:srgbClr>
+          </a:solidFill>
+          <a:ln w="38100" cap="flat" cmpd="sng" algn="ctr">
+            <a:solidFill>
+              <a:srgbClr val="C00000"/>
+            </a:solidFill>
+            <a:prstDash val="solid"/>
+            <a:miter lim="800000"/>
+          </a:ln>
+          <a:effectLst/>
+        </p:spPr>
+        <p:txBody>
+          <a:bodyPr rtlCol="0" anchor="ctr"/>
+          <a:lstStyle/>
+          <a:p>
+            <a:pPr algn="ctr" defTabSz="1216152">
+              <a:defRPr/>
+            </a:pPr>
+            <a:r>
               <a:rPr lang="en-US" sz="1862" kern="0" dirty="0">
                 <a:solidFill>
                   <a:sysClr val="windowText" lastClr="000000"/>
@@ -10387,8 +10401,8 @@
         </p:nvCxnSpPr>
         <p:spPr>
           <a:xfrm flipV="1">
-            <a:off x="4502565" y="1791413"/>
-            <a:ext cx="359395" cy="2291726"/>
+            <a:off x="4502564" y="1791411"/>
+            <a:ext cx="359395" cy="2291727"/>
           </a:xfrm>
           <a:prstGeom prst="straightConnector1">
             <a:avLst/>
@@ -11070,7 +11084,7 @@
         <p:spPr>
           <a:xfrm flipV="1">
             <a:off x="4502564" y="1815984"/>
-            <a:ext cx="2406042" cy="2267155"/>
+            <a:ext cx="2406042" cy="2267154"/>
           </a:xfrm>
           <a:prstGeom prst="straightConnector1">
             <a:avLst/>
@@ -11275,9 +11289,9 @@
               <a:lumOff val="80000"/>
             </a:srgbClr>
           </a:solidFill>
-          <a:ln w="6350" cap="flat" cmpd="sng" algn="ctr">
+          <a:ln w="38100" cap="flat" cmpd="sng" algn="ctr">
             <a:solidFill>
-              <a:srgbClr val="687CA1"/>
+              <a:srgbClr val="C00000"/>
             </a:solidFill>
             <a:prstDash val="solid"/>
             <a:miter lim="800000"/>
@@ -11326,8 +11340,8 @@
         </p:nvCxnSpPr>
         <p:spPr>
           <a:xfrm>
-            <a:off x="5666951" y="5343507"/>
-            <a:ext cx="978717" cy="606078"/>
+            <a:off x="5757180" y="5379147"/>
+            <a:ext cx="888488" cy="570438"/>
           </a:xfrm>
           <a:prstGeom prst="straightConnector1">
             <a:avLst/>
@@ -12169,18 +12183,18 @@
 </file>
 
 <file path=customXml/item1.xml><?xml version="1.0" encoding="utf-8"?>
-<p:properties xmlns:p="http://schemas.microsoft.com/office/2006/metadata/properties" xmlns:xsi="http://www.w3.org/2001/XMLSchema-instance" xmlns:pc="http://schemas.microsoft.com/office/infopath/2007/PartnerControls">
-  <documentManagement/>
-</p:properties>
-</file>
-
-<file path=customXml/item2.xml><?xml version="1.0" encoding="utf-8"?>
 <?mso-contentType ?>
 <FormTemplates xmlns="http://schemas.microsoft.com/sharepoint/v3/contenttype/forms">
   <Display>DocumentLibraryForm</Display>
   <Edit>DocumentLibraryForm</Edit>
   <New>DocumentLibraryForm</New>
 </FormTemplates>
+</file>
+
+<file path=customXml/item2.xml><?xml version="1.0" encoding="utf-8"?>
+<p:properties xmlns:p="http://schemas.microsoft.com/office/2006/metadata/properties" xmlns:xsi="http://www.w3.org/2001/XMLSchema-instance" xmlns:pc="http://schemas.microsoft.com/office/infopath/2007/PartnerControls">
+  <documentManagement/>
+</p:properties>
 </file>
 
 <file path=customXml/item3.xml><?xml version="1.0" encoding="utf-8"?>
@@ -12401,6 +12415,14 @@
 </file>
 
 <file path=customXml/itemProps1.xml><?xml version="1.0" encoding="utf-8"?>
+<ds:datastoreItem xmlns:ds="http://schemas.openxmlformats.org/officeDocument/2006/customXml" ds:itemID="{3538CD67-8D2F-4D66-97D6-5A8C2109C81C}">
+  <ds:schemaRefs>
+    <ds:schemaRef ds:uri="http://schemas.microsoft.com/sharepoint/v3/contenttype/forms"/>
+  </ds:schemaRefs>
+</ds:datastoreItem>
+</file>
+
+<file path=customXml/itemProps2.xml><?xml version="1.0" encoding="utf-8"?>
 <ds:datastoreItem xmlns:ds="http://schemas.openxmlformats.org/officeDocument/2006/customXml" ds:itemID="{16865FFE-5233-4A4B-BF4A-9D8501DB6C61}">
   <ds:schemaRefs>
     <ds:schemaRef ds:uri="http://purl.org/dc/terms/"/>
@@ -12413,14 +12435,6 @@
     <ds:schemaRef ds:uri="77e7b415-3fa1-4e40-925a-34ab31ed8693"/>
     <ds:schemaRef ds:uri="http://www.w3.org/XML/1998/namespace"/>
     <ds:schemaRef ds:uri="http://purl.org/dc/dcmitype/"/>
-  </ds:schemaRefs>
-</ds:datastoreItem>
-</file>
-
-<file path=customXml/itemProps2.xml><?xml version="1.0" encoding="utf-8"?>
-<ds:datastoreItem xmlns:ds="http://schemas.openxmlformats.org/officeDocument/2006/customXml" ds:itemID="{3538CD67-8D2F-4D66-97D6-5A8C2109C81C}">
-  <ds:schemaRefs>
-    <ds:schemaRef ds:uri="http://schemas.microsoft.com/sharepoint/v3/contenttype/forms"/>
   </ds:schemaRefs>
 </ds:datastoreItem>
 </file>

</xml_diff>